<commit_message>
Added more to tutorial
</commit_message>
<xml_diff>
--- a/images/tutorial_images.pptx
+++ b/images/tutorial_images.pptx
@@ -10,6 +10,7 @@
     <p:sldId id="258" r:id="rId4"/>
     <p:sldId id="261" r:id="rId5"/>
     <p:sldId id="259" r:id="rId6"/>
+    <p:sldId id="262" r:id="rId7"/>
   </p:sldIdLst>
   <p:sldSz cx="9144000" cy="6858000" type="screen4x3"/>
   <p:notesSz cx="6858000" cy="9144000"/>
@@ -3571,6 +3572,13 @@
   <p:clrMapOvr>
     <a:masterClrMapping/>
   </p:clrMapOvr>
+  <p:timing>
+    <p:tnLst>
+      <p:par>
+        <p:cTn xmlns:p14="http://schemas.microsoft.com/office/powerpoint/2010/main" id="1" dur="indefinite" restart="never" nodeType="tmRoot"/>
+      </p:par>
+    </p:tnLst>
+  </p:timing>
 </p:sld>
 </file>
 
@@ -3723,10 +3731,221 @@
           </a:p>
         </p:txBody>
       </p:sp>
+      <p:sp>
+        <p:nvSpPr>
+          <p:cNvPr id="9" name="Rounded Rectangular Callout 8"/>
+          <p:cNvSpPr/>
+          <p:nvPr/>
+        </p:nvSpPr>
+        <p:spPr>
+          <a:xfrm>
+            <a:off x="2070730" y="2665044"/>
+            <a:ext cx="2843803" cy="924984"/>
+          </a:xfrm>
+          <a:prstGeom prst="wedgeRoundRectCallout">
+            <a:avLst>
+              <a:gd name="adj1" fmla="val -61610"/>
+              <a:gd name="adj2" fmla="val -56903"/>
+              <a:gd name="adj3" fmla="val 16667"/>
+            </a:avLst>
+          </a:prstGeom>
+        </p:spPr>
+        <p:style>
+          <a:lnRef idx="2">
+            <a:schemeClr val="dk1"/>
+          </a:lnRef>
+          <a:fillRef idx="1">
+            <a:schemeClr val="lt1"/>
+          </a:fillRef>
+          <a:effectRef idx="0">
+            <a:schemeClr val="dk1"/>
+          </a:effectRef>
+          <a:fontRef idx="minor">
+            <a:schemeClr val="dk1"/>
+          </a:fontRef>
+        </p:style>
+        <p:txBody>
+          <a:bodyPr rtlCol="0" anchor="ctr"/>
+          <a:lstStyle/>
+          <a:p>
+            <a:pPr algn="ctr"/>
+            <a:endParaRPr lang="en-US"/>
+          </a:p>
+        </p:txBody>
+      </p:sp>
+      <p:sp>
+        <p:nvSpPr>
+          <p:cNvPr id="10" name="TextBox 9"/>
+          <p:cNvSpPr txBox="1"/>
+          <p:nvPr/>
+        </p:nvSpPr>
+        <p:spPr>
+          <a:xfrm>
+            <a:off x="2263998" y="2913547"/>
+            <a:ext cx="2429657" cy="369332"/>
+          </a:xfrm>
+          <a:prstGeom prst="rect">
+            <a:avLst/>
+          </a:prstGeom>
+          <a:noFill/>
+        </p:spPr>
+        <p:txBody>
+          <a:bodyPr wrap="square" rtlCol="0">
+            <a:spAutoFit/>
+          </a:bodyPr>
+          <a:lstStyle/>
+          <a:p>
+            <a:r>
+              <a:rPr lang="en-US" dirty="0" smtClean="0"/>
+              <a:t>Enter your title here</a:t>
+            </a:r>
+            <a:endParaRPr lang="en-US" dirty="0"/>
+          </a:p>
+        </p:txBody>
+      </p:sp>
     </p:spTree>
     <p:extLst>
       <p:ext uri="{BB962C8B-B14F-4D97-AF65-F5344CB8AC3E}">
         <p14:creationId xmlns:p14="http://schemas.microsoft.com/office/powerpoint/2010/main" val="297775267"/>
+      </p:ext>
+    </p:extLst>
+  </p:cSld>
+  <p:clrMapOvr>
+    <a:masterClrMapping/>
+  </p:clrMapOvr>
+  <p:timing>
+    <p:tnLst>
+      <p:par>
+        <p:cTn xmlns:p14="http://schemas.microsoft.com/office/powerpoint/2010/main" id="1" dur="indefinite" restart="never" nodeType="tmRoot"/>
+      </p:par>
+    </p:tnLst>
+  </p:timing>
+</p:sld>
+</file>
+
+<file path=ppt/slides/slide6.xml><?xml version="1.0" encoding="utf-8"?>
+<p:sld xmlns:a="http://schemas.openxmlformats.org/drawingml/2006/main" xmlns:r="http://schemas.openxmlformats.org/officeDocument/2006/relationships" xmlns:p="http://schemas.openxmlformats.org/presentationml/2006/main">
+  <p:cSld>
+    <p:spTree>
+      <p:nvGrpSpPr>
+        <p:cNvPr id="1" name=""/>
+        <p:cNvGrpSpPr/>
+        <p:nvPr/>
+      </p:nvGrpSpPr>
+      <p:grpSpPr>
+        <a:xfrm>
+          <a:off x="0" y="0"/>
+          <a:ext cx="0" cy="0"/>
+          <a:chOff x="0" y="0"/>
+          <a:chExt cx="0" cy="0"/>
+        </a:xfrm>
+      </p:grpSpPr>
+      <p:pic>
+        <p:nvPicPr>
+          <p:cNvPr id="5" name="Picture 4" descr="Screen Shot 2013-02-01 at 5.21.34 PM.png"/>
+          <p:cNvPicPr>
+            <a:picLocks noChangeAspect="1"/>
+          </p:cNvPicPr>
+          <p:nvPr/>
+        </p:nvPicPr>
+        <p:blipFill>
+          <a:blip r:embed="rId2">
+            <a:extLst>
+              <a:ext uri="{28A0092B-C50C-407E-A947-70E740481C1C}">
+                <a14:useLocalDpi xmlns:a14="http://schemas.microsoft.com/office/drawing/2010/main" val="0"/>
+              </a:ext>
+            </a:extLst>
+          </a:blip>
+          <a:stretch>
+            <a:fillRect/>
+          </a:stretch>
+        </p:blipFill>
+        <p:spPr>
+          <a:xfrm>
+            <a:off x="0" y="228600"/>
+            <a:ext cx="9144000" cy="6380196"/>
+          </a:xfrm>
+          <a:prstGeom prst="rect">
+            <a:avLst/>
+          </a:prstGeom>
+        </p:spPr>
+      </p:pic>
+      <p:sp>
+        <p:nvSpPr>
+          <p:cNvPr id="6" name="Rounded Rectangular Callout 5"/>
+          <p:cNvSpPr/>
+          <p:nvPr/>
+        </p:nvSpPr>
+        <p:spPr>
+          <a:xfrm>
+            <a:off x="5121606" y="4569700"/>
+            <a:ext cx="2181170" cy="855956"/>
+          </a:xfrm>
+          <a:prstGeom prst="wedgeRoundRectCallout">
+            <a:avLst>
+              <a:gd name="adj1" fmla="val 16380"/>
+              <a:gd name="adj2" fmla="val -76976"/>
+              <a:gd name="adj3" fmla="val 16667"/>
+            </a:avLst>
+          </a:prstGeom>
+        </p:spPr>
+        <p:style>
+          <a:lnRef idx="2">
+            <a:schemeClr val="dk1"/>
+          </a:lnRef>
+          <a:fillRef idx="1">
+            <a:schemeClr val="lt1"/>
+          </a:fillRef>
+          <a:effectRef idx="0">
+            <a:schemeClr val="dk1"/>
+          </a:effectRef>
+          <a:fontRef idx="minor">
+            <a:schemeClr val="dk1"/>
+          </a:fontRef>
+        </p:style>
+        <p:txBody>
+          <a:bodyPr rtlCol="0" anchor="ctr"/>
+          <a:lstStyle/>
+          <a:p>
+            <a:pPr algn="ctr"/>
+            <a:endParaRPr lang="en-US"/>
+          </a:p>
+        </p:txBody>
+      </p:sp>
+      <p:sp>
+        <p:nvSpPr>
+          <p:cNvPr id="7" name="TextBox 6"/>
+          <p:cNvSpPr txBox="1"/>
+          <p:nvPr/>
+        </p:nvSpPr>
+        <p:spPr>
+          <a:xfrm>
+            <a:off x="5328680" y="4749172"/>
+            <a:ext cx="1804350" cy="523220"/>
+          </a:xfrm>
+          <a:prstGeom prst="rect">
+            <a:avLst/>
+          </a:prstGeom>
+          <a:noFill/>
+        </p:spPr>
+        <p:txBody>
+          <a:bodyPr wrap="none" rtlCol="0">
+            <a:spAutoFit/>
+          </a:bodyPr>
+          <a:lstStyle/>
+          <a:p>
+            <a:r>
+              <a:rPr lang="en-US" sz="2800" dirty="0" smtClean="0"/>
+              <a:t>Click “Edit”</a:t>
+            </a:r>
+            <a:endParaRPr lang="en-US" sz="2800" dirty="0"/>
+          </a:p>
+        </p:txBody>
+      </p:sp>
+    </p:spTree>
+    <p:extLst>
+      <p:ext uri="{BB962C8B-B14F-4D97-AF65-F5344CB8AC3E}">
+        <p14:creationId xmlns:p14="http://schemas.microsoft.com/office/powerpoint/2010/main" val="2423560390"/>
       </p:ext>
     </p:extLst>
   </p:cSld>

</xml_diff>